<commit_message>
cut most of it
</commit_message>
<xml_diff>
--- a/Урок 4. Dockerfile и слои_Антон Мельник_3901.pptx
+++ b/Урок 4. Dockerfile и слои_Антон Мельник_3901.pptx
@@ -12,6 +12,7 @@
     <p:sldId id="260" r:id="rId6"/>
     <p:sldId id="261" r:id="rId7"/>
     <p:sldId id="262" r:id="rId8"/>
+    <p:sldId id="263" r:id="rId9"/>
   </p:sldIdLst>
   <p:sldSz cx="12192000" cy="6858000"/>
   <p:notesSz cx="6858000" cy="9144000"/>
@@ -3746,6 +3747,89 @@
 </p:sld>
 </file>
 
+<file path=ppt/slides/slide8.xml><?xml version="1.0" encoding="utf-8"?>
+<p:sld xmlns:a="http://schemas.openxmlformats.org/drawingml/2006/main" xmlns:r="http://schemas.openxmlformats.org/officeDocument/2006/relationships" xmlns:p="http://schemas.openxmlformats.org/presentationml/2006/main">
+  <p:cSld>
+    <p:spTree>
+      <p:nvGrpSpPr>
+        <p:cNvPr id="1" name=""/>
+        <p:cNvGrpSpPr/>
+        <p:nvPr/>
+      </p:nvGrpSpPr>
+      <p:grpSpPr>
+        <a:xfrm>
+          <a:off x="0" y="0"/>
+          <a:ext cx="0" cy="0"/>
+          <a:chOff x="0" y="0"/>
+          <a:chExt cx="0" cy="0"/>
+        </a:xfrm>
+      </p:grpSpPr>
+      <p:sp>
+        <p:nvSpPr>
+          <p:cNvPr id="2" name="Заголовок 1"/>
+          <p:cNvSpPr>
+            <a:spLocks noGrp="1"/>
+          </p:cNvSpPr>
+          <p:nvPr>
+            <p:ph type="title"/>
+          </p:nvPr>
+        </p:nvSpPr>
+        <p:spPr/>
+        <p:txBody>
+          <a:bodyPr/>
+          <a:lstStyle/>
+          <a:p>
+            <a:r>
+              <a:rPr lang="en-US" dirty="0" smtClean="0"/>
+              <a:t>Proof-of-concept, </a:t>
+            </a:r>
+            <a:r>
+              <a:rPr lang="ru-RU" dirty="0" smtClean="0"/>
+              <a:t>запускаем почти пустой файл…работает</a:t>
+            </a:r>
+            <a:endParaRPr lang="ru-RU" dirty="0"/>
+          </a:p>
+        </p:txBody>
+      </p:sp>
+      <p:pic>
+        <p:nvPicPr>
+          <p:cNvPr id="4" name="Объект 3"/>
+          <p:cNvPicPr>
+            <a:picLocks noGrp="1" noChangeAspect="1"/>
+          </p:cNvPicPr>
+          <p:nvPr>
+            <p:ph idx="1"/>
+          </p:nvPr>
+        </p:nvPicPr>
+        <p:blipFill>
+          <a:blip r:embed="rId2"/>
+          <a:stretch>
+            <a:fillRect/>
+          </a:stretch>
+        </p:blipFill>
+        <p:spPr>
+          <a:xfrm>
+            <a:off x="3920331" y="1825625"/>
+            <a:ext cx="4351338" cy="4351338"/>
+          </a:xfrm>
+          <a:prstGeom prst="rect">
+            <a:avLst/>
+          </a:prstGeom>
+        </p:spPr>
+      </p:pic>
+    </p:spTree>
+    <p:extLst>
+      <p:ext uri="{BB962C8B-B14F-4D97-AF65-F5344CB8AC3E}">
+        <p14:creationId xmlns:p14="http://schemas.microsoft.com/office/powerpoint/2010/main" val="325694145"/>
+      </p:ext>
+    </p:extLst>
+  </p:cSld>
+  <p:clrMapOvr>
+    <a:masterClrMapping/>
+  </p:clrMapOvr>
+</p:sld>
+</file>
+
 <file path=ppt/theme/theme1.xml><?xml version="1.0" encoding="utf-8"?>
 <a:theme xmlns:a="http://schemas.openxmlformats.org/drawingml/2006/main" name="Тема Office">
   <a:themeElements>

</xml_diff>